<commit_message>
Update diagrams for DG and update DG
</commit_message>
<xml_diff>
--- a/docs/diagrams/SelectSequenceDiagram.pptx
+++ b/docs/diagrams/SelectSequenceDiagram.pptx
@@ -473,6 +473,90 @@
     </a:lvl9pPr>
   </p:notesStyle>
 </p:notesMaster>
+</file>
+
+<file path=ppt/notesSlides/notesSlide1.xml><?xml version="1.0" encoding="utf-8"?>
+<p:notes xmlns:a="http://schemas.openxmlformats.org/drawingml/2006/main" xmlns:r="http://schemas.openxmlformats.org/officeDocument/2006/relationships" xmlns:p="http://schemas.openxmlformats.org/presentationml/2006/main">
+  <p:cSld>
+    <p:spTree>
+      <p:nvGrpSpPr>
+        <p:cNvPr id="1" name=""/>
+        <p:cNvGrpSpPr/>
+        <p:nvPr/>
+      </p:nvGrpSpPr>
+      <p:grpSpPr>
+        <a:xfrm>
+          <a:off x="0" y="0"/>
+          <a:ext cx="0" cy="0"/>
+          <a:chOff x="0" y="0"/>
+          <a:chExt cx="0" cy="0"/>
+        </a:xfrm>
+      </p:grpSpPr>
+      <p:sp>
+        <p:nvSpPr>
+          <p:cNvPr id="2" name="Slide Image Placeholder 1"/>
+          <p:cNvSpPr>
+            <a:spLocks noGrp="1" noRot="1" noChangeAspect="1"/>
+          </p:cNvSpPr>
+          <p:nvPr>
+            <p:ph type="sldImg"/>
+          </p:nvPr>
+        </p:nvSpPr>
+        <p:spPr/>
+      </p:sp>
+      <p:sp>
+        <p:nvSpPr>
+          <p:cNvPr id="3" name="Notes Placeholder 2"/>
+          <p:cNvSpPr>
+            <a:spLocks noGrp="1"/>
+          </p:cNvSpPr>
+          <p:nvPr>
+            <p:ph type="body" idx="1"/>
+          </p:nvPr>
+        </p:nvSpPr>
+        <p:spPr/>
+        <p:txBody>
+          <a:bodyPr/>
+          <a:lstStyle/>
+          <a:p>
+            <a:endParaRPr lang="en-US" dirty="0"/>
+          </a:p>
+        </p:txBody>
+      </p:sp>
+      <p:sp>
+        <p:nvSpPr>
+          <p:cNvPr id="4" name="Slide Number Placeholder 3"/>
+          <p:cNvSpPr>
+            <a:spLocks noGrp="1"/>
+          </p:cNvSpPr>
+          <p:nvPr>
+            <p:ph type="sldNum" sz="quarter" idx="5"/>
+          </p:nvPr>
+        </p:nvSpPr>
+        <p:spPr/>
+        <p:txBody>
+          <a:bodyPr/>
+          <a:lstStyle/>
+          <a:p>
+            <a:fld id="{5A7AB025-77E3-4BD1-A2FD-B3183DBA47A3}" type="slidenum">
+              <a:rPr lang="en-US" smtClean="0"/>
+              <a:t>1</a:t>
+            </a:fld>
+            <a:endParaRPr lang="en-US"/>
+          </a:p>
+        </p:txBody>
+      </p:sp>
+    </p:spTree>
+    <p:extLst>
+      <p:ext uri="{BB962C8B-B14F-4D97-AF65-F5344CB8AC3E}">
+        <p14:creationId xmlns:p14="http://schemas.microsoft.com/office/powerpoint/2010/main" val="669040702"/>
+      </p:ext>
+    </p:extLst>
+  </p:cSld>
+  <p:clrMapOvr>
+    <a:masterClrMapping/>
+  </p:clrMapOvr>
+</p:notes>
 </file>
 
 <file path=ppt/slideLayouts/slideLayout1.xml><?xml version="1.0" encoding="utf-8"?>
@@ -3450,8 +3534,8 @@
         </p:nvSpPr>
         <p:spPr>
           <a:xfrm>
-            <a:off x="5181600" y="533399"/>
-            <a:ext cx="1644131" cy="4356803"/>
+            <a:off x="6248400" y="839144"/>
+            <a:ext cx="1644131" cy="5485449"/>
           </a:xfrm>
           <a:prstGeom prst="roundRect">
             <a:avLst>
@@ -3511,8 +3595,8 @@
         </p:nvSpPr>
         <p:spPr>
           <a:xfrm>
-            <a:off x="-762000" y="533400"/>
-            <a:ext cx="5863964" cy="4343400"/>
+            <a:off x="-762001" y="838204"/>
+            <a:ext cx="6910523" cy="5468574"/>
           </a:xfrm>
           <a:prstGeom prst="roundRect">
             <a:avLst>
@@ -3572,8 +3656,8 @@
         </p:nvSpPr>
         <p:spPr>
           <a:xfrm>
-            <a:off x="-91631" y="958357"/>
-            <a:ext cx="1455629" cy="346760"/>
+            <a:off x="74905" y="948391"/>
+            <a:ext cx="1158430" cy="346760"/>
           </a:xfrm>
           <a:prstGeom prst="rect">
             <a:avLst/>
@@ -3608,7 +3692,7 @@
           <a:p>
             <a:pPr algn="ctr"/>
             <a:r>
-              <a:rPr lang="en-US" sz="1600" dirty="0">
+              <a:rPr lang="en-US" sz="1200" dirty="0">
                 <a:solidFill>
                   <a:schemeClr val="bg1"/>
                 </a:solidFill>
@@ -3616,14 +3700,14 @@
               <a:t>:</a:t>
             </a:r>
             <a:r>
-              <a:rPr lang="en-US" sz="1600" dirty="0" err="1">
+              <a:rPr lang="en-US" sz="1200" dirty="0" err="1">
                 <a:solidFill>
                   <a:schemeClr val="bg1"/>
                 </a:solidFill>
               </a:rPr>
               <a:t>LogicManager</a:t>
             </a:r>
-            <a:endParaRPr lang="en-SG" sz="1600" dirty="0">
+            <a:endParaRPr lang="en-SG" sz="1200" dirty="0">
               <a:solidFill>
                 <a:schemeClr val="bg1"/>
               </a:solidFill>
@@ -3640,9 +3724,9 @@
           <p:nvPr/>
         </p:nvCxnSpPr>
         <p:spPr>
-          <a:xfrm>
-            <a:off x="636184" y="1282988"/>
-            <a:ext cx="0" cy="3481399"/>
+          <a:xfrm flipH="1">
+            <a:off x="652808" y="1273535"/>
+            <a:ext cx="6415" cy="4934099"/>
           </a:xfrm>
           <a:prstGeom prst="line">
             <a:avLst/>
@@ -3679,7 +3763,7 @@
         <p:spPr>
           <a:xfrm>
             <a:off x="567513" y="1603552"/>
-            <a:ext cx="152400" cy="2932689"/>
+            <a:ext cx="159861" cy="4411322"/>
           </a:xfrm>
           <a:prstGeom prst="rect">
             <a:avLst/>
@@ -3717,89 +3801,6 @@
           </a:p>
         </p:txBody>
       </p:sp>
-      <p:sp>
-        <p:nvSpPr>
-          <p:cNvPr id="16" name="Rectangle 62"/>
-          <p:cNvSpPr/>
-          <p:nvPr/>
-        </p:nvSpPr>
-        <p:spPr>
-          <a:xfrm>
-            <a:off x="2207375" y="793404"/>
-            <a:ext cx="1219200" cy="467684"/>
-          </a:xfrm>
-          <a:prstGeom prst="rect">
-            <a:avLst/>
-          </a:prstGeom>
-          <a:solidFill>
-            <a:srgbClr val="0070C0"/>
-          </a:solidFill>
-          <a:ln w="19050">
-            <a:solidFill>
-              <a:srgbClr val="0070C0"/>
-            </a:solidFill>
-          </a:ln>
-          <a:effectLst/>
-        </p:spPr>
-        <p:style>
-          <a:lnRef idx="1">
-            <a:schemeClr val="accent2"/>
-          </a:lnRef>
-          <a:fillRef idx="2">
-            <a:schemeClr val="accent2"/>
-          </a:fillRef>
-          <a:effectRef idx="1">
-            <a:schemeClr val="accent2"/>
-          </a:effectRef>
-          <a:fontRef idx="minor">
-            <a:schemeClr val="dk1"/>
-          </a:fontRef>
-        </p:style>
-        <p:txBody>
-          <a:bodyPr rtlCol="0" anchor="ctr"/>
-          <a:lstStyle/>
-          <a:p>
-            <a:pPr algn="ctr"/>
-            <a:r>
-              <a:rPr lang="en-US" sz="1600" dirty="0">
-                <a:solidFill>
-                  <a:schemeClr val="bg1"/>
-                </a:solidFill>
-              </a:rPr>
-              <a:t>:</a:t>
-            </a:r>
-            <a:r>
-              <a:rPr lang="en-US" sz="1600" dirty="0" err="1">
-                <a:solidFill>
-                  <a:schemeClr val="bg1"/>
-                </a:solidFill>
-              </a:rPr>
-              <a:t>FoodDiary</a:t>
-            </a:r>
-            <a:endParaRPr lang="en-US" sz="1600" dirty="0">
-              <a:solidFill>
-                <a:schemeClr val="bg1"/>
-              </a:solidFill>
-            </a:endParaRPr>
-          </a:p>
-          <a:p>
-            <a:pPr algn="ctr"/>
-            <a:r>
-              <a:rPr lang="en-US" sz="1600" dirty="0">
-                <a:solidFill>
-                  <a:schemeClr val="bg1"/>
-                </a:solidFill>
-              </a:rPr>
-              <a:t>Parser</a:t>
-            </a:r>
-            <a:endParaRPr lang="en-SG" sz="1600" dirty="0">
-              <a:solidFill>
-                <a:schemeClr val="bg1"/>
-              </a:solidFill>
-            </a:endParaRPr>
-          </a:p>
-        </p:txBody>
-      </p:sp>
       <p:cxnSp>
         <p:nvCxnSpPr>
           <p:cNvPr id="17" name="Straight Connector 16"/>
@@ -3809,9 +3810,9 @@
           <p:nvPr/>
         </p:nvCxnSpPr>
         <p:spPr>
-          <a:xfrm>
-            <a:off x="2820774" y="1277999"/>
-            <a:ext cx="0" cy="1482984"/>
+          <a:xfrm flipH="1">
+            <a:off x="2486104" y="1066800"/>
+            <a:ext cx="1218" cy="2609753"/>
           </a:xfrm>
           <a:prstGeom prst="line">
             <a:avLst/>
@@ -3847,8 +3848,8 @@
         </p:nvSpPr>
         <p:spPr>
           <a:xfrm>
-            <a:off x="2748767" y="1736192"/>
-            <a:ext cx="154408" cy="767790"/>
+            <a:off x="2415315" y="1736192"/>
+            <a:ext cx="154408" cy="1794546"/>
           </a:xfrm>
           <a:prstGeom prst="rect">
             <a:avLst/>
@@ -3890,94 +3891,6 @@
           </a:p>
         </p:txBody>
       </p:sp>
-      <p:cxnSp>
-        <p:nvCxnSpPr>
-          <p:cNvPr id="20" name="Straight Connector 19"/>
-          <p:cNvCxnSpPr>
-            <a:cxnSpLocks/>
-            <a:stCxn id="21" idx="0"/>
-            <a:endCxn id="4" idx="0"/>
-          </p:cNvCxnSpPr>
-          <p:nvPr/>
-        </p:nvCxnSpPr>
-        <p:spPr>
-          <a:xfrm>
-            <a:off x="4372269" y="1984015"/>
-            <a:ext cx="0" cy="2644578"/>
-          </a:xfrm>
-          <a:prstGeom prst="line">
-            <a:avLst/>
-          </a:prstGeom>
-          <a:ln w="19050">
-            <a:solidFill>
-              <a:srgbClr val="0070C0"/>
-            </a:solidFill>
-            <a:prstDash val="sysDash"/>
-          </a:ln>
-          <a:effectLst/>
-        </p:spPr>
-        <p:style>
-          <a:lnRef idx="1">
-            <a:schemeClr val="accent1"/>
-          </a:lnRef>
-          <a:fillRef idx="2">
-            <a:schemeClr val="accent1"/>
-          </a:fillRef>
-          <a:effectRef idx="1">
-            <a:schemeClr val="accent1"/>
-          </a:effectRef>
-          <a:fontRef idx="minor">
-            <a:schemeClr val="dk1"/>
-          </a:fontRef>
-        </p:style>
-      </p:cxnSp>
-      <p:sp>
-        <p:nvSpPr>
-          <p:cNvPr id="21" name="Rectangle 20"/>
-          <p:cNvSpPr/>
-          <p:nvPr/>
-        </p:nvSpPr>
-        <p:spPr>
-          <a:xfrm>
-            <a:off x="4296069" y="1984015"/>
-            <a:ext cx="152400" cy="276003"/>
-          </a:xfrm>
-          <a:prstGeom prst="rect">
-            <a:avLst/>
-          </a:prstGeom>
-          <a:solidFill>
-            <a:srgbClr val="0070C0"/>
-          </a:solidFill>
-          <a:ln>
-            <a:solidFill>
-              <a:srgbClr val="0070C0"/>
-            </a:solidFill>
-          </a:ln>
-          <a:effectLst/>
-        </p:spPr>
-        <p:style>
-          <a:lnRef idx="1">
-            <a:schemeClr val="accent3"/>
-          </a:lnRef>
-          <a:fillRef idx="2">
-            <a:schemeClr val="accent3"/>
-          </a:fillRef>
-          <a:effectRef idx="1">
-            <a:schemeClr val="accent3"/>
-          </a:effectRef>
-          <a:fontRef idx="minor">
-            <a:schemeClr val="dk1"/>
-          </a:fontRef>
-        </p:style>
-        <p:txBody>
-          <a:bodyPr rtlCol="0" anchor="ctr"/>
-          <a:lstStyle/>
-          <a:p>
-            <a:pPr algn="ctr"/>
-            <a:endParaRPr lang="en-SG" sz="1400"/>
-          </a:p>
-        </p:txBody>
-      </p:sp>
       <p:sp>
         <p:nvSpPr>
           <p:cNvPr id="26" name="TextBox 25"/>
@@ -4012,44 +3925,6 @@
           </a:p>
         </p:txBody>
       </p:sp>
-      <p:cxnSp>
-        <p:nvCxnSpPr>
-          <p:cNvPr id="28" name="Straight Arrow Connector 27"/>
-          <p:cNvCxnSpPr>
-            <a:cxnSpLocks/>
-          </p:cNvCxnSpPr>
-          <p:nvPr/>
-        </p:nvCxnSpPr>
-        <p:spPr>
-          <a:xfrm>
-            <a:off x="2903175" y="1882722"/>
-            <a:ext cx="925376" cy="1"/>
-          </a:xfrm>
-          <a:prstGeom prst="straightConnector1">
-            <a:avLst/>
-          </a:prstGeom>
-          <a:ln w="19050">
-            <a:solidFill>
-              <a:srgbClr val="0070C0"/>
-            </a:solidFill>
-            <a:tailEnd type="arrow"/>
-          </a:ln>
-        </p:spPr>
-        <p:style>
-          <a:lnRef idx="1">
-            <a:schemeClr val="accent1"/>
-          </a:lnRef>
-          <a:fillRef idx="0">
-            <a:schemeClr val="accent1"/>
-          </a:fillRef>
-          <a:effectRef idx="0">
-            <a:schemeClr val="accent1"/>
-          </a:effectRef>
-          <a:fontRef idx="minor">
-            <a:schemeClr val="tx1"/>
-          </a:fontRef>
-        </p:style>
-      </p:cxnSp>
       <p:sp>
         <p:nvSpPr>
           <p:cNvPr id="29" name="TextBox 28"/>
@@ -4058,7 +3933,7 @@
         </p:nvSpPr>
         <p:spPr>
           <a:xfrm>
-            <a:off x="2013608" y="2854453"/>
+            <a:off x="2650070" y="3488255"/>
             <a:ext cx="855809" cy="215444"/>
           </a:xfrm>
           <a:prstGeom prst="rect">
@@ -4092,44 +3967,6 @@
       </p:sp>
       <p:cxnSp>
         <p:nvCxnSpPr>
-          <p:cNvPr id="34" name="Straight Arrow Connector 33"/>
-          <p:cNvCxnSpPr/>
-          <p:nvPr/>
-        </p:nvCxnSpPr>
-        <p:spPr>
-          <a:xfrm>
-            <a:off x="2879295" y="2248614"/>
-            <a:ext cx="1492974" cy="0"/>
-          </a:xfrm>
-          <a:prstGeom prst="straightConnector1">
-            <a:avLst/>
-          </a:prstGeom>
-          <a:ln w="19050">
-            <a:solidFill>
-              <a:srgbClr val="0070C0"/>
-            </a:solidFill>
-            <a:prstDash val="sysDash"/>
-            <a:headEnd type="arrow" w="med" len="med"/>
-            <a:tailEnd type="none" w="med" len="med"/>
-          </a:ln>
-        </p:spPr>
-        <p:style>
-          <a:lnRef idx="1">
-            <a:schemeClr val="accent1"/>
-          </a:lnRef>
-          <a:fillRef idx="0">
-            <a:schemeClr val="accent1"/>
-          </a:fillRef>
-          <a:effectRef idx="0">
-            <a:schemeClr val="accent1"/>
-          </a:effectRef>
-          <a:fontRef idx="minor">
-            <a:schemeClr val="tx1"/>
-          </a:fontRef>
-        </p:style>
-      </p:cxnSp>
-      <p:cxnSp>
-        <p:nvCxnSpPr>
           <p:cNvPr id="35" name="Straight Arrow Connector 34"/>
           <p:cNvCxnSpPr>
             <a:cxnSpLocks/>
@@ -4138,8 +3975,8 @@
         </p:nvCxnSpPr>
         <p:spPr>
           <a:xfrm>
-            <a:off x="727385" y="2503982"/>
-            <a:ext cx="2082220" cy="0"/>
+            <a:off x="727882" y="3530048"/>
+            <a:ext cx="1687930" cy="0"/>
           </a:xfrm>
           <a:prstGeom prst="straightConnector1">
             <a:avLst/>
@@ -4172,14 +4009,15 @@
         <p:nvCxnSpPr>
           <p:cNvPr id="37" name="Straight Arrow Connector 36"/>
           <p:cNvCxnSpPr>
+            <a:cxnSpLocks/>
             <a:endCxn id="6" idx="2"/>
           </p:cNvCxnSpPr>
           <p:nvPr/>
         </p:nvCxnSpPr>
         <p:spPr>
           <a:xfrm>
-            <a:off x="-815541" y="4536241"/>
-            <a:ext cx="1459254" cy="0"/>
+            <a:off x="-776527" y="6009952"/>
+            <a:ext cx="1423971" cy="4922"/>
           </a:xfrm>
           <a:prstGeom prst="straightConnector1">
             <a:avLst/>
@@ -4210,60 +4048,13 @@
       </p:cxnSp>
       <p:sp>
         <p:nvSpPr>
-          <p:cNvPr id="65" name="Rectangle 64"/>
-          <p:cNvSpPr/>
-          <p:nvPr/>
-        </p:nvSpPr>
-        <p:spPr>
-          <a:xfrm>
-            <a:off x="4296675" y="3101695"/>
-            <a:ext cx="161322" cy="1307285"/>
-          </a:xfrm>
-          <a:prstGeom prst="rect">
-            <a:avLst/>
-          </a:prstGeom>
-          <a:solidFill>
-            <a:srgbClr val="0070C0"/>
-          </a:solidFill>
-          <a:ln>
-            <a:solidFill>
-              <a:srgbClr val="0070C0"/>
-            </a:solidFill>
-          </a:ln>
-          <a:effectLst/>
-        </p:spPr>
-        <p:style>
-          <a:lnRef idx="1">
-            <a:schemeClr val="accent3"/>
-          </a:lnRef>
-          <a:fillRef idx="2">
-            <a:schemeClr val="accent3"/>
-          </a:fillRef>
-          <a:effectRef idx="1">
-            <a:schemeClr val="accent3"/>
-          </a:effectRef>
-          <a:fontRef idx="minor">
-            <a:schemeClr val="dk1"/>
-          </a:fontRef>
-        </p:style>
-        <p:txBody>
-          <a:bodyPr rtlCol="0" anchor="ctr"/>
-          <a:lstStyle/>
-          <a:p>
-            <a:pPr algn="ctr"/>
-            <a:endParaRPr lang="en-SG" sz="1400"/>
-          </a:p>
-        </p:txBody>
-      </p:sp>
-      <p:sp>
-        <p:nvSpPr>
           <p:cNvPr id="79" name="TextBox 78"/>
           <p:cNvSpPr txBox="1"/>
           <p:nvPr/>
         </p:nvSpPr>
         <p:spPr>
           <a:xfrm>
-            <a:off x="4487355" y="3007016"/>
+            <a:off x="5554155" y="3549632"/>
             <a:ext cx="1380045" cy="323165"/>
           </a:xfrm>
           <a:prstGeom prst="rect">
@@ -4315,7 +4106,7 @@
                   </a:schemeClr>
                 </a:solidFill>
               </a:rPr>
-              <a:t>(Restaurant)</a:t>
+              <a:t>(restaurant)</a:t>
             </a:r>
             <a:endParaRPr lang="en-US" sz="1050" dirty="0"/>
           </a:p>
@@ -4329,7 +4120,7 @@
         </p:nvSpPr>
         <p:spPr>
           <a:xfrm>
-            <a:off x="470202" y="1524000"/>
+            <a:off x="207788" y="1524424"/>
             <a:ext cx="2165398" cy="184666"/>
           </a:xfrm>
           <a:prstGeom prst="rect">
@@ -4373,7 +4164,7 @@
         </p:nvSpPr>
         <p:spPr>
           <a:xfrm>
-            <a:off x="1494979" y="2276175"/>
+            <a:off x="1495476" y="3302241"/>
             <a:ext cx="220343" cy="215444"/>
           </a:xfrm>
           <a:prstGeom prst="rect">
@@ -4413,7 +4204,7 @@
         </p:nvSpPr>
         <p:spPr>
           <a:xfrm>
-            <a:off x="5693593" y="2731585"/>
+            <a:off x="6773401" y="3245170"/>
             <a:ext cx="841636" cy="300180"/>
           </a:xfrm>
           <a:prstGeom prst="rect">
@@ -4474,8 +4265,8 @@
         </p:nvCxnSpPr>
         <p:spPr>
           <a:xfrm flipH="1">
-            <a:off x="6114411" y="3034456"/>
-            <a:ext cx="3959" cy="1735710"/>
+            <a:off x="7185170" y="3545350"/>
+            <a:ext cx="1" cy="2398250"/>
           </a:xfrm>
           <a:prstGeom prst="line">
             <a:avLst/>
@@ -4511,8 +4302,8 @@
         </p:nvSpPr>
         <p:spPr>
           <a:xfrm>
-            <a:off x="6034107" y="3323867"/>
-            <a:ext cx="168896" cy="775693"/>
+            <a:off x="7100908" y="3834761"/>
+            <a:ext cx="166060" cy="1956433"/>
           </a:xfrm>
           <a:prstGeom prst="rect">
             <a:avLst/>
@@ -4560,7 +4351,7 @@
         </p:nvCxnSpPr>
         <p:spPr>
           <a:xfrm flipV="1">
-            <a:off x="4460970" y="3337054"/>
+            <a:off x="5527770" y="3879670"/>
             <a:ext cx="1576612" cy="6530"/>
           </a:xfrm>
           <a:prstGeom prst="straightConnector1">
@@ -4588,113 +4379,6 @@
           </a:fontRef>
         </p:style>
       </p:cxnSp>
-      <p:sp>
-        <p:nvSpPr>
-          <p:cNvPr id="4" name="TextBox 3"/>
-          <p:cNvSpPr txBox="1"/>
-          <p:nvPr/>
-        </p:nvSpPr>
-        <p:spPr>
-          <a:xfrm>
-            <a:off x="4243067" y="4628593"/>
-            <a:ext cx="258404" cy="261610"/>
-          </a:xfrm>
-          <a:prstGeom prst="rect">
-            <a:avLst/>
-          </a:prstGeom>
-          <a:noFill/>
-        </p:spPr>
-        <p:txBody>
-          <a:bodyPr wrap="none" rtlCol="0">
-            <a:spAutoFit/>
-          </a:bodyPr>
-          <a:lstStyle/>
-          <a:p>
-            <a:r>
-              <a:rPr lang="en-SG" sz="1100" dirty="0">
-                <a:solidFill>
-                  <a:srgbClr val="002060"/>
-                </a:solidFill>
-              </a:rPr>
-              <a:t>X</a:t>
-            </a:r>
-          </a:p>
-        </p:txBody>
-      </p:sp>
-      <p:sp>
-        <p:nvSpPr>
-          <p:cNvPr id="19" name="Rectangle 62"/>
-          <p:cNvSpPr/>
-          <p:nvPr/>
-        </p:nvSpPr>
-        <p:spPr>
-          <a:xfrm>
-            <a:off x="3806163" y="1630650"/>
-            <a:ext cx="1093635" cy="461538"/>
-          </a:xfrm>
-          <a:prstGeom prst="rect">
-            <a:avLst/>
-          </a:prstGeom>
-          <a:solidFill>
-            <a:srgbClr val="0070C0"/>
-          </a:solidFill>
-          <a:ln w="19050">
-            <a:solidFill>
-              <a:srgbClr val="0070C0"/>
-            </a:solidFill>
-          </a:ln>
-          <a:effectLst/>
-        </p:spPr>
-        <p:style>
-          <a:lnRef idx="1">
-            <a:schemeClr val="accent2"/>
-          </a:lnRef>
-          <a:fillRef idx="2">
-            <a:schemeClr val="accent2"/>
-          </a:fillRef>
-          <a:effectRef idx="1">
-            <a:schemeClr val="accent2"/>
-          </a:effectRef>
-          <a:fontRef idx="minor">
-            <a:schemeClr val="dk1"/>
-          </a:fontRef>
-        </p:style>
-        <p:txBody>
-          <a:bodyPr rtlCol="0" anchor="ctr"/>
-          <a:lstStyle/>
-          <a:p>
-            <a:pPr algn="ctr"/>
-            <a:r>
-              <a:rPr lang="en-US" sz="1600" dirty="0" err="1">
-                <a:solidFill>
-                  <a:schemeClr val="bg1"/>
-                </a:solidFill>
-              </a:rPr>
-              <a:t>s:Select</a:t>
-            </a:r>
-            <a:br>
-              <a:rPr lang="en-US" sz="1600" dirty="0">
-                <a:solidFill>
-                  <a:schemeClr val="bg1"/>
-                </a:solidFill>
-              </a:rPr>
-            </a:br>
-            <a:r>
-              <a:rPr lang="en-US" sz="1600" dirty="0">
-                <a:solidFill>
-                  <a:schemeClr val="bg1"/>
-                </a:solidFill>
-              </a:rPr>
-              <a:t>Command</a:t>
-            </a:r>
-            <a:endParaRPr lang="en-SG" sz="1600" dirty="0">
-              <a:solidFill>
-                <a:schemeClr val="bg1"/>
-              </a:solidFill>
-            </a:endParaRPr>
-          </a:p>
-        </p:txBody>
-      </p:sp>
       <p:cxnSp>
         <p:nvCxnSpPr>
           <p:cNvPr id="66" name="Straight Arrow Connector 65">
@@ -4710,9 +4394,9 @@
           <p:nvPr/>
         </p:nvCxnSpPr>
         <p:spPr>
-          <a:xfrm>
-            <a:off x="727385" y="3088292"/>
-            <a:ext cx="3566317" cy="13405"/>
+          <a:xfrm flipV="1">
+            <a:off x="714076" y="3754589"/>
+            <a:ext cx="4781707" cy="1"/>
           </a:xfrm>
           <a:prstGeom prst="straightConnector1">
             <a:avLst/>
@@ -4755,8 +4439,8 @@
         </p:nvCxnSpPr>
         <p:spPr>
           <a:xfrm flipV="1">
-            <a:off x="727385" y="1752600"/>
-            <a:ext cx="2007752" cy="1891"/>
+            <a:off x="727385" y="1754491"/>
+            <a:ext cx="1687930" cy="1"/>
           </a:xfrm>
           <a:prstGeom prst="straightConnector1">
             <a:avLst/>
@@ -4794,13 +4478,14 @@
           </p:cNvPr>
           <p:cNvCxnSpPr>
             <a:cxnSpLocks/>
+            <a:endCxn id="4" idx="0"/>
           </p:cNvCxnSpPr>
           <p:nvPr/>
         </p:nvCxnSpPr>
         <p:spPr>
-          <a:xfrm flipV="1">
-            <a:off x="727385" y="4406844"/>
-            <a:ext cx="3566317" cy="2136"/>
+          <a:xfrm>
+            <a:off x="727374" y="5901611"/>
+            <a:ext cx="4861905" cy="51708"/>
           </a:xfrm>
           <a:prstGeom prst="straightConnector1">
             <a:avLst/>
@@ -4846,8 +4531,8 @@
         </p:nvCxnSpPr>
         <p:spPr>
           <a:xfrm>
-            <a:off x="4457997" y="4099560"/>
-            <a:ext cx="1660558" cy="0"/>
+            <a:off x="5675007" y="5784664"/>
+            <a:ext cx="1508931" cy="6530"/>
           </a:xfrm>
           <a:prstGeom prst="straightConnector1">
             <a:avLst/>
@@ -4884,8 +4569,8 @@
         </p:nvSpPr>
         <p:spPr>
           <a:xfrm>
-            <a:off x="6874644" y="533399"/>
-            <a:ext cx="3488556" cy="4343401"/>
+            <a:off x="7941444" y="838203"/>
+            <a:ext cx="3488556" cy="5468575"/>
           </a:xfrm>
           <a:prstGeom prst="roundRect">
             <a:avLst>
@@ -4946,7 +4631,7 @@
         </p:nvSpPr>
         <p:spPr>
           <a:xfrm>
-            <a:off x="6967110" y="2822919"/>
+            <a:off x="8033910" y="3333813"/>
             <a:ext cx="576690" cy="346760"/>
           </a:xfrm>
           <a:prstGeom prst="rect">
@@ -5013,8 +4698,8 @@
         </p:nvSpPr>
         <p:spPr>
           <a:xfrm>
-            <a:off x="7138558" y="3391958"/>
-            <a:ext cx="171851" cy="604986"/>
+            <a:off x="8205358" y="3902852"/>
+            <a:ext cx="177222" cy="1732455"/>
           </a:xfrm>
           <a:prstGeom prst="rect">
             <a:avLst/>
@@ -5062,8 +4747,8 @@
         </p:nvCxnSpPr>
         <p:spPr>
           <a:xfrm>
-            <a:off x="7238585" y="3165659"/>
-            <a:ext cx="415" cy="1598728"/>
+            <a:off x="8305385" y="3676553"/>
+            <a:ext cx="0" cy="2267047"/>
           </a:xfrm>
           <a:prstGeom prst="line">
             <a:avLst/>
@@ -5107,8 +4792,8 @@
         </p:nvCxnSpPr>
         <p:spPr>
           <a:xfrm>
-            <a:off x="6203003" y="4003547"/>
-            <a:ext cx="967933" cy="0"/>
+            <a:off x="7279612" y="5635307"/>
+            <a:ext cx="1003521" cy="0"/>
           </a:xfrm>
           <a:prstGeom prst="straightConnector1">
             <a:avLst/>
@@ -5145,7 +4830,7 @@
         </p:nvSpPr>
         <p:spPr>
           <a:xfrm>
-            <a:off x="7890966" y="2857656"/>
+            <a:off x="8957766" y="3368550"/>
             <a:ext cx="2429867" cy="346760"/>
           </a:xfrm>
           <a:prstGeom prst="rect">
@@ -5214,7 +4899,7 @@
         </p:nvCxnSpPr>
         <p:spPr>
           <a:xfrm>
-            <a:off x="7317845" y="3516601"/>
+            <a:off x="8384645" y="4027495"/>
             <a:ext cx="1745551" cy="0"/>
           </a:xfrm>
           <a:prstGeom prst="straightConnector1">
@@ -5252,8 +4937,8 @@
         </p:nvCxnSpPr>
         <p:spPr>
           <a:xfrm>
-            <a:off x="9108226" y="3228174"/>
-            <a:ext cx="17921" cy="1537539"/>
+            <a:off x="10175026" y="3739068"/>
+            <a:ext cx="11643" cy="935792"/>
           </a:xfrm>
           <a:prstGeom prst="line">
             <a:avLst/>
@@ -5297,7 +4982,7 @@
         </p:nvCxnSpPr>
         <p:spPr>
           <a:xfrm>
-            <a:off x="7317845" y="3912902"/>
+            <a:off x="8384645" y="4423796"/>
             <a:ext cx="1753425" cy="0"/>
           </a:xfrm>
           <a:prstGeom prst="straightConnector1">
@@ -5379,7 +5064,7 @@
         </p:nvCxnSpPr>
         <p:spPr>
           <a:xfrm flipV="1">
-            <a:off x="6214694" y="3405784"/>
+            <a:off x="7281494" y="3916678"/>
             <a:ext cx="922392" cy="1"/>
           </a:xfrm>
           <a:prstGeom prst="straightConnector1">
@@ -5415,7 +5100,7 @@
         </p:nvSpPr>
         <p:spPr>
           <a:xfrm>
-            <a:off x="9050383" y="3505200"/>
+            <a:off x="10117183" y="4016094"/>
             <a:ext cx="136007" cy="407697"/>
           </a:xfrm>
           <a:prstGeom prst="rect">
@@ -5468,7 +5153,7 @@
         </p:nvSpPr>
         <p:spPr>
           <a:xfrm>
-            <a:off x="2082638" y="4177997"/>
+            <a:off x="2601087" y="5676942"/>
             <a:ext cx="855809" cy="215444"/>
           </a:xfrm>
           <a:prstGeom prst="rect">
@@ -5515,7 +5200,7 @@
         </p:nvSpPr>
         <p:spPr>
           <a:xfrm>
-            <a:off x="8067836" y="3349823"/>
+            <a:off x="9134636" y="3860717"/>
             <a:ext cx="2120786" cy="307777"/>
           </a:xfrm>
           <a:prstGeom prst="rect">
@@ -5561,7 +5246,7 @@
                   <a:srgbClr val="00B050"/>
                 </a:solidFill>
               </a:rPr>
-              <a:t>(Restaurant)</a:t>
+              <a:t>(restaurant)</a:t>
             </a:r>
           </a:p>
         </p:txBody>
@@ -5582,7 +5267,7 @@
         </p:nvCxnSpPr>
         <p:spPr>
           <a:xfrm rot="16200000" flipH="1">
-            <a:off x="9169362" y="3546496"/>
+            <a:off x="10236162" y="4057390"/>
             <a:ext cx="82495" cy="52375"/>
           </a:xfrm>
           <a:prstGeom prst="bentConnector4">
@@ -5632,7 +5317,7 @@
         </p:nvCxnSpPr>
         <p:spPr>
           <a:xfrm rot="16200000" flipH="1">
-            <a:off x="9069168" y="3795675"/>
+            <a:off x="10135968" y="4306569"/>
             <a:ext cx="176833" cy="57611"/>
           </a:xfrm>
           <a:prstGeom prst="bentConnector4">
@@ -5680,7 +5365,7 @@
         </p:nvSpPr>
         <p:spPr>
           <a:xfrm>
-            <a:off x="9120592" y="3616195"/>
+            <a:off x="10187392" y="4127089"/>
             <a:ext cx="118086" cy="193805"/>
           </a:xfrm>
           <a:prstGeom prst="rect">
@@ -5716,6 +5401,1603 @@
           <a:p>
             <a:pPr algn="ctr"/>
             <a:endParaRPr lang="en-SG" sz="1400"/>
+          </a:p>
+        </p:txBody>
+      </p:sp>
+      <p:sp>
+        <p:nvSpPr>
+          <p:cNvPr id="52" name="Rectangle 62">
+            <a:extLst>
+              <a:ext uri="{FF2B5EF4-FFF2-40B4-BE49-F238E27FC236}">
+                <a16:creationId xmlns:a16="http://schemas.microsoft.com/office/drawing/2014/main" id="{E53453D0-7C10-C342-B5FE-D501BFEA66C2}"/>
+              </a:ext>
+            </a:extLst>
+          </p:cNvPr>
+          <p:cNvSpPr/>
+          <p:nvPr/>
+        </p:nvSpPr>
+        <p:spPr>
+          <a:xfrm>
+            <a:off x="9296827" y="4724400"/>
+            <a:ext cx="1784069" cy="346760"/>
+          </a:xfrm>
+          <a:prstGeom prst="rect">
+            <a:avLst/>
+          </a:prstGeom>
+          <a:solidFill>
+            <a:srgbClr val="00B050"/>
+          </a:solidFill>
+          <a:ln w="19050">
+            <a:solidFill>
+              <a:srgbClr val="00B050"/>
+            </a:solidFill>
+          </a:ln>
+          <a:effectLst/>
+        </p:spPr>
+        <p:style>
+          <a:lnRef idx="1">
+            <a:schemeClr val="accent2"/>
+          </a:lnRef>
+          <a:fillRef idx="2">
+            <a:schemeClr val="accent2"/>
+          </a:fillRef>
+          <a:effectRef idx="1">
+            <a:schemeClr val="accent2"/>
+          </a:effectRef>
+          <a:fontRef idx="minor">
+            <a:schemeClr val="dk1"/>
+          </a:fontRef>
+        </p:style>
+        <p:txBody>
+          <a:bodyPr rtlCol="0" anchor="ctr"/>
+          <a:lstStyle/>
+          <a:p>
+            <a:pPr algn="ctr"/>
+            <a:r>
+              <a:rPr lang="en-US" sz="1600" dirty="0">
+                <a:solidFill>
+                  <a:schemeClr val="bg1"/>
+                </a:solidFill>
+              </a:rPr>
+              <a:t>:</a:t>
+            </a:r>
+            <a:r>
+              <a:rPr lang="en-US" sz="1600" dirty="0" err="1">
+                <a:solidFill>
+                  <a:schemeClr val="bg1"/>
+                </a:solidFill>
+              </a:rPr>
+              <a:t>ReviewListPanel</a:t>
+            </a:r>
+            <a:endParaRPr lang="en-SG" sz="1600" dirty="0">
+              <a:solidFill>
+                <a:schemeClr val="bg1"/>
+              </a:solidFill>
+            </a:endParaRPr>
+          </a:p>
+        </p:txBody>
+      </p:sp>
+      <p:cxnSp>
+        <p:nvCxnSpPr>
+          <p:cNvPr id="55" name="Straight Arrow Connector 54">
+            <a:extLst>
+              <a:ext uri="{FF2B5EF4-FFF2-40B4-BE49-F238E27FC236}">
+                <a16:creationId xmlns:a16="http://schemas.microsoft.com/office/drawing/2014/main" id="{B6FC8749-6365-FE4A-ACC4-8B0071F35FF6}"/>
+              </a:ext>
+            </a:extLst>
+          </p:cNvPr>
+          <p:cNvCxnSpPr>
+            <a:cxnSpLocks/>
+          </p:cNvCxnSpPr>
+          <p:nvPr/>
+        </p:nvCxnSpPr>
+        <p:spPr>
+          <a:xfrm>
+            <a:off x="8391490" y="5269200"/>
+            <a:ext cx="1745551" cy="0"/>
+          </a:xfrm>
+          <a:prstGeom prst="straightConnector1">
+            <a:avLst/>
+          </a:prstGeom>
+          <a:ln w="19050">
+            <a:solidFill>
+              <a:srgbClr val="00B050"/>
+            </a:solidFill>
+            <a:tailEnd type="arrow"/>
+          </a:ln>
+        </p:spPr>
+        <p:style>
+          <a:lnRef idx="1">
+            <a:schemeClr val="accent1"/>
+          </a:lnRef>
+          <a:fillRef idx="0">
+            <a:schemeClr val="accent1"/>
+          </a:fillRef>
+          <a:effectRef idx="0">
+            <a:schemeClr val="accent1"/>
+          </a:effectRef>
+          <a:fontRef idx="minor">
+            <a:schemeClr val="tx1"/>
+          </a:fontRef>
+        </p:style>
+      </p:cxnSp>
+      <p:cxnSp>
+        <p:nvCxnSpPr>
+          <p:cNvPr id="58" name="Straight Connector 57">
+            <a:extLst>
+              <a:ext uri="{FF2B5EF4-FFF2-40B4-BE49-F238E27FC236}">
+                <a16:creationId xmlns:a16="http://schemas.microsoft.com/office/drawing/2014/main" id="{2857760F-EA43-4943-97EC-7BAD57E0B33E}"/>
+              </a:ext>
+            </a:extLst>
+          </p:cNvPr>
+          <p:cNvCxnSpPr>
+            <a:cxnSpLocks/>
+          </p:cNvCxnSpPr>
+          <p:nvPr/>
+        </p:nvCxnSpPr>
+        <p:spPr>
+          <a:xfrm>
+            <a:off x="10181871" y="5099438"/>
+            <a:ext cx="415" cy="844162"/>
+          </a:xfrm>
+          <a:prstGeom prst="line">
+            <a:avLst/>
+          </a:prstGeom>
+          <a:ln w="19050">
+            <a:solidFill>
+              <a:srgbClr val="00B050"/>
+            </a:solidFill>
+            <a:prstDash val="sysDash"/>
+          </a:ln>
+          <a:effectLst/>
+        </p:spPr>
+        <p:style>
+          <a:lnRef idx="1">
+            <a:schemeClr val="accent1"/>
+          </a:lnRef>
+          <a:fillRef idx="2">
+            <a:schemeClr val="accent1"/>
+          </a:fillRef>
+          <a:effectRef idx="1">
+            <a:schemeClr val="accent1"/>
+          </a:effectRef>
+          <a:fontRef idx="minor">
+            <a:schemeClr val="dk1"/>
+          </a:fontRef>
+        </p:style>
+      </p:cxnSp>
+      <p:cxnSp>
+        <p:nvCxnSpPr>
+          <p:cNvPr id="60" name="Straight Arrow Connector 59">
+            <a:extLst>
+              <a:ext uri="{FF2B5EF4-FFF2-40B4-BE49-F238E27FC236}">
+                <a16:creationId xmlns:a16="http://schemas.microsoft.com/office/drawing/2014/main" id="{7E346587-9371-2040-8B8A-5EE21C941879}"/>
+              </a:ext>
+            </a:extLst>
+          </p:cNvPr>
+          <p:cNvCxnSpPr>
+            <a:cxnSpLocks/>
+          </p:cNvCxnSpPr>
+          <p:nvPr/>
+        </p:nvCxnSpPr>
+        <p:spPr>
+          <a:xfrm>
+            <a:off x="8363758" y="5508402"/>
+            <a:ext cx="1753425" cy="0"/>
+          </a:xfrm>
+          <a:prstGeom prst="straightConnector1">
+            <a:avLst/>
+          </a:prstGeom>
+          <a:ln w="19050">
+            <a:solidFill>
+              <a:srgbClr val="00B050"/>
+            </a:solidFill>
+            <a:prstDash val="sysDash"/>
+            <a:headEnd type="arrow" w="med" len="med"/>
+            <a:tailEnd type="none" w="med" len="med"/>
+          </a:ln>
+        </p:spPr>
+        <p:style>
+          <a:lnRef idx="1">
+            <a:schemeClr val="accent1"/>
+          </a:lnRef>
+          <a:fillRef idx="0">
+            <a:schemeClr val="accent1"/>
+          </a:fillRef>
+          <a:effectRef idx="0">
+            <a:schemeClr val="accent1"/>
+          </a:effectRef>
+          <a:fontRef idx="minor">
+            <a:schemeClr val="tx1"/>
+          </a:fontRef>
+        </p:style>
+      </p:cxnSp>
+      <p:sp>
+        <p:nvSpPr>
+          <p:cNvPr id="62" name="Rectangle 61">
+            <a:extLst>
+              <a:ext uri="{FF2B5EF4-FFF2-40B4-BE49-F238E27FC236}">
+                <a16:creationId xmlns:a16="http://schemas.microsoft.com/office/drawing/2014/main" id="{C3540766-D897-6049-8892-51CF7324113C}"/>
+              </a:ext>
+            </a:extLst>
+          </p:cNvPr>
+          <p:cNvSpPr/>
+          <p:nvPr/>
+        </p:nvSpPr>
+        <p:spPr>
+          <a:xfrm>
+            <a:off x="10124029" y="5257800"/>
+            <a:ext cx="120984" cy="250602"/>
+          </a:xfrm>
+          <a:prstGeom prst="rect">
+            <a:avLst/>
+          </a:prstGeom>
+          <a:solidFill>
+            <a:srgbClr val="00B050"/>
+          </a:solidFill>
+          <a:ln>
+            <a:solidFill>
+              <a:srgbClr val="7030A0"/>
+            </a:solidFill>
+          </a:ln>
+          <a:effectLst/>
+        </p:spPr>
+        <p:style>
+          <a:lnRef idx="1">
+            <a:schemeClr val="accent3"/>
+          </a:lnRef>
+          <a:fillRef idx="2">
+            <a:schemeClr val="accent3"/>
+          </a:fillRef>
+          <a:effectRef idx="1">
+            <a:schemeClr val="accent3"/>
+          </a:effectRef>
+          <a:fontRef idx="minor">
+            <a:schemeClr val="dk1"/>
+          </a:fontRef>
+        </p:style>
+        <p:txBody>
+          <a:bodyPr rtlCol="0" anchor="ctr"/>
+          <a:lstStyle/>
+          <a:p>
+            <a:pPr algn="ctr"/>
+            <a:endParaRPr lang="en-SG" sz="1400"/>
+          </a:p>
+        </p:txBody>
+      </p:sp>
+      <p:sp>
+        <p:nvSpPr>
+          <p:cNvPr id="76" name="Rectangle 75">
+            <a:extLst>
+              <a:ext uri="{FF2B5EF4-FFF2-40B4-BE49-F238E27FC236}">
+                <a16:creationId xmlns:a16="http://schemas.microsoft.com/office/drawing/2014/main" id="{D774C8D3-97D7-E849-BE3A-2E64DC11F134}"/>
+              </a:ext>
+            </a:extLst>
+          </p:cNvPr>
+          <p:cNvSpPr/>
+          <p:nvPr/>
+        </p:nvSpPr>
+        <p:spPr>
+          <a:xfrm>
+            <a:off x="4158605" y="1781397"/>
+            <a:ext cx="152400" cy="276003"/>
+          </a:xfrm>
+          <a:prstGeom prst="rect">
+            <a:avLst/>
+          </a:prstGeom>
+          <a:solidFill>
+            <a:srgbClr val="0070C0"/>
+          </a:solidFill>
+          <a:ln>
+            <a:solidFill>
+              <a:srgbClr val="0070C0"/>
+            </a:solidFill>
+          </a:ln>
+          <a:effectLst/>
+        </p:spPr>
+        <p:style>
+          <a:lnRef idx="1">
+            <a:schemeClr val="accent3"/>
+          </a:lnRef>
+          <a:fillRef idx="2">
+            <a:schemeClr val="accent3"/>
+          </a:fillRef>
+          <a:effectRef idx="1">
+            <a:schemeClr val="accent3"/>
+          </a:effectRef>
+          <a:fontRef idx="minor">
+            <a:schemeClr val="dk1"/>
+          </a:fontRef>
+        </p:style>
+        <p:txBody>
+          <a:bodyPr rtlCol="0" anchor="ctr"/>
+          <a:lstStyle/>
+          <a:p>
+            <a:pPr algn="ctr"/>
+            <a:endParaRPr lang="en-SG" sz="1200"/>
+          </a:p>
+        </p:txBody>
+      </p:sp>
+      <p:cxnSp>
+        <p:nvCxnSpPr>
+          <p:cNvPr id="77" name="Straight Arrow Connector 76">
+            <a:extLst>
+              <a:ext uri="{FF2B5EF4-FFF2-40B4-BE49-F238E27FC236}">
+                <a16:creationId xmlns:a16="http://schemas.microsoft.com/office/drawing/2014/main" id="{6DDEF4B3-E9E5-2C47-8CBF-1DC003E0A128}"/>
+              </a:ext>
+            </a:extLst>
+          </p:cNvPr>
+          <p:cNvCxnSpPr>
+            <a:cxnSpLocks/>
+          </p:cNvCxnSpPr>
+          <p:nvPr/>
+        </p:nvCxnSpPr>
+        <p:spPr>
+          <a:xfrm flipV="1">
+            <a:off x="2566959" y="1820389"/>
+            <a:ext cx="1195710" cy="9255"/>
+          </a:xfrm>
+          <a:prstGeom prst="straightConnector1">
+            <a:avLst/>
+          </a:prstGeom>
+          <a:ln w="19050">
+            <a:solidFill>
+              <a:srgbClr val="0070C0"/>
+            </a:solidFill>
+            <a:tailEnd type="arrow"/>
+          </a:ln>
+        </p:spPr>
+        <p:style>
+          <a:lnRef idx="1">
+            <a:schemeClr val="accent1"/>
+          </a:lnRef>
+          <a:fillRef idx="0">
+            <a:schemeClr val="accent1"/>
+          </a:fillRef>
+          <a:effectRef idx="0">
+            <a:schemeClr val="accent1"/>
+          </a:effectRef>
+          <a:fontRef idx="minor">
+            <a:schemeClr val="tx1"/>
+          </a:fontRef>
+        </p:style>
+      </p:cxnSp>
+      <p:cxnSp>
+        <p:nvCxnSpPr>
+          <p:cNvPr id="78" name="Straight Arrow Connector 77">
+            <a:extLst>
+              <a:ext uri="{FF2B5EF4-FFF2-40B4-BE49-F238E27FC236}">
+                <a16:creationId xmlns:a16="http://schemas.microsoft.com/office/drawing/2014/main" id="{D198F725-56E0-AC4E-8513-0DC134FFE4FB}"/>
+              </a:ext>
+            </a:extLst>
+          </p:cNvPr>
+          <p:cNvCxnSpPr>
+            <a:cxnSpLocks/>
+            <a:endCxn id="76" idx="2"/>
+          </p:cNvCxnSpPr>
+          <p:nvPr/>
+        </p:nvCxnSpPr>
+        <p:spPr>
+          <a:xfrm>
+            <a:off x="2573877" y="2042788"/>
+            <a:ext cx="1660928" cy="14612"/>
+          </a:xfrm>
+          <a:prstGeom prst="straightConnector1">
+            <a:avLst/>
+          </a:prstGeom>
+          <a:ln w="19050">
+            <a:solidFill>
+              <a:srgbClr val="0070C0"/>
+            </a:solidFill>
+            <a:prstDash val="sysDash"/>
+            <a:headEnd type="arrow" w="med" len="med"/>
+            <a:tailEnd type="none" w="med" len="med"/>
+          </a:ln>
+        </p:spPr>
+        <p:style>
+          <a:lnRef idx="1">
+            <a:schemeClr val="accent1"/>
+          </a:lnRef>
+          <a:fillRef idx="0">
+            <a:schemeClr val="accent1"/>
+          </a:fillRef>
+          <a:effectRef idx="0">
+            <a:schemeClr val="accent1"/>
+          </a:effectRef>
+          <a:fontRef idx="minor">
+            <a:schemeClr val="tx1"/>
+          </a:fontRef>
+        </p:style>
+      </p:cxnSp>
+      <p:sp>
+        <p:nvSpPr>
+          <p:cNvPr id="83" name="TextBox 82">
+            <a:extLst>
+              <a:ext uri="{FF2B5EF4-FFF2-40B4-BE49-F238E27FC236}">
+                <a16:creationId xmlns:a16="http://schemas.microsoft.com/office/drawing/2014/main" id="{9C1120DA-D7EB-A44A-A42F-83694A1D91C0}"/>
+              </a:ext>
+            </a:extLst>
+          </p:cNvPr>
+          <p:cNvSpPr txBox="1"/>
+          <p:nvPr/>
+        </p:nvSpPr>
+        <p:spPr>
+          <a:xfrm>
+            <a:off x="2483168" y="2109939"/>
+            <a:ext cx="1271654" cy="169277"/>
+          </a:xfrm>
+          <a:prstGeom prst="rect">
+            <a:avLst/>
+          </a:prstGeom>
+          <a:noFill/>
+        </p:spPr>
+        <p:txBody>
+          <a:bodyPr wrap="square" lIns="0" tIns="0" rIns="0" bIns="0" rtlCol="0">
+            <a:spAutoFit/>
+          </a:bodyPr>
+          <a:lstStyle>
+            <a:defPPr>
+              <a:defRPr lang="en-US"/>
+            </a:defPPr>
+            <a:lvl1pPr algn="r">
+              <a:defRPr sz="1400">
+                <a:solidFill>
+                  <a:srgbClr val="0070C0"/>
+                </a:solidFill>
+              </a:defRPr>
+            </a:lvl1pPr>
+          </a:lstStyle>
+          <a:p>
+            <a:r>
+              <a:rPr lang="en-US" sz="1100" dirty="0"/>
+              <a:t>parse(</a:t>
+            </a:r>
+            <a:r>
+              <a:rPr lang="en-US" sz="1100" dirty="0" err="1"/>
+              <a:t>args</a:t>
+            </a:r>
+            <a:r>
+              <a:rPr lang="en-US" sz="1100" dirty="0"/>
+              <a:t>)</a:t>
+            </a:r>
+          </a:p>
+        </p:txBody>
+      </p:sp>
+      <p:cxnSp>
+        <p:nvCxnSpPr>
+          <p:cNvPr id="84" name="Straight Arrow Connector 83">
+            <a:extLst>
+              <a:ext uri="{FF2B5EF4-FFF2-40B4-BE49-F238E27FC236}">
+                <a16:creationId xmlns:a16="http://schemas.microsoft.com/office/drawing/2014/main" id="{33B7EDEC-349C-FC41-B488-F505B7F96BBC}"/>
+              </a:ext>
+            </a:extLst>
+          </p:cNvPr>
+          <p:cNvCxnSpPr>
+            <a:cxnSpLocks/>
+          </p:cNvCxnSpPr>
+          <p:nvPr/>
+        </p:nvCxnSpPr>
+        <p:spPr>
+          <a:xfrm flipV="1">
+            <a:off x="2477490" y="2257459"/>
+            <a:ext cx="1681115" cy="5815"/>
+          </a:xfrm>
+          <a:prstGeom prst="straightConnector1">
+            <a:avLst/>
+          </a:prstGeom>
+          <a:ln w="19050">
+            <a:solidFill>
+              <a:srgbClr val="0070C0"/>
+            </a:solidFill>
+            <a:tailEnd type="arrow"/>
+          </a:ln>
+        </p:spPr>
+        <p:style>
+          <a:lnRef idx="1">
+            <a:schemeClr val="accent1"/>
+          </a:lnRef>
+          <a:fillRef idx="0">
+            <a:schemeClr val="accent1"/>
+          </a:fillRef>
+          <a:effectRef idx="0">
+            <a:schemeClr val="accent1"/>
+          </a:effectRef>
+          <a:fontRef idx="minor">
+            <a:schemeClr val="tx1"/>
+          </a:fontRef>
+        </p:style>
+      </p:cxnSp>
+      <p:sp>
+        <p:nvSpPr>
+          <p:cNvPr id="86" name="TextBox 85">
+            <a:extLst>
+              <a:ext uri="{FF2B5EF4-FFF2-40B4-BE49-F238E27FC236}">
+                <a16:creationId xmlns:a16="http://schemas.microsoft.com/office/drawing/2014/main" id="{FEAF3D64-923C-324B-A950-F7C977601320}"/>
+              </a:ext>
+            </a:extLst>
+          </p:cNvPr>
+          <p:cNvSpPr txBox="1"/>
+          <p:nvPr/>
+        </p:nvSpPr>
+        <p:spPr>
+          <a:xfrm>
+            <a:off x="4220780" y="2147957"/>
+            <a:ext cx="1442999" cy="184666"/>
+          </a:xfrm>
+          <a:prstGeom prst="rect">
+            <a:avLst/>
+          </a:prstGeom>
+          <a:noFill/>
+        </p:spPr>
+        <p:txBody>
+          <a:bodyPr wrap="square" lIns="0" tIns="0" rIns="0" bIns="0" rtlCol="0">
+            <a:spAutoFit/>
+          </a:bodyPr>
+          <a:lstStyle>
+            <a:defPPr>
+              <a:defRPr lang="en-US"/>
+            </a:defPPr>
+            <a:lvl1pPr algn="r">
+              <a:defRPr sz="1400">
+                <a:solidFill>
+                  <a:srgbClr val="0070C0"/>
+                </a:solidFill>
+              </a:defRPr>
+            </a:lvl1pPr>
+          </a:lstStyle>
+          <a:p>
+            <a:pPr algn="ctr"/>
+            <a:r>
+              <a:rPr lang="en-US" sz="1200" dirty="0" err="1"/>
+              <a:t>parseIndex</a:t>
+            </a:r>
+            <a:r>
+              <a:rPr lang="en-US" sz="1200" dirty="0"/>
+              <a:t>(</a:t>
+            </a:r>
+            <a:r>
+              <a:rPr lang="en-US" sz="1200" dirty="0" err="1"/>
+              <a:t>args</a:t>
+            </a:r>
+            <a:r>
+              <a:rPr lang="en-US" sz="1200" dirty="0"/>
+              <a:t>)</a:t>
+            </a:r>
+          </a:p>
+        </p:txBody>
+      </p:sp>
+      <p:cxnSp>
+        <p:nvCxnSpPr>
+          <p:cNvPr id="89" name="Straight Arrow Connector 88">
+            <a:extLst>
+              <a:ext uri="{FF2B5EF4-FFF2-40B4-BE49-F238E27FC236}">
+                <a16:creationId xmlns:a16="http://schemas.microsoft.com/office/drawing/2014/main" id="{671B41F9-EFED-B941-9436-33E0C176ACEB}"/>
+              </a:ext>
+            </a:extLst>
+          </p:cNvPr>
+          <p:cNvCxnSpPr>
+            <a:cxnSpLocks/>
+          </p:cNvCxnSpPr>
+          <p:nvPr/>
+        </p:nvCxnSpPr>
+        <p:spPr>
+          <a:xfrm>
+            <a:off x="4310593" y="2375947"/>
+            <a:ext cx="1217177" cy="0"/>
+          </a:xfrm>
+          <a:prstGeom prst="straightConnector1">
+            <a:avLst/>
+          </a:prstGeom>
+          <a:ln w="19050">
+            <a:solidFill>
+              <a:srgbClr val="0070C0"/>
+            </a:solidFill>
+            <a:tailEnd type="arrow"/>
+          </a:ln>
+        </p:spPr>
+        <p:style>
+          <a:lnRef idx="1">
+            <a:schemeClr val="accent1"/>
+          </a:lnRef>
+          <a:fillRef idx="0">
+            <a:schemeClr val="accent1"/>
+          </a:fillRef>
+          <a:effectRef idx="0">
+            <a:schemeClr val="accent1"/>
+          </a:effectRef>
+          <a:fontRef idx="minor">
+            <a:schemeClr val="tx1"/>
+          </a:fontRef>
+        </p:style>
+      </p:cxnSp>
+      <p:cxnSp>
+        <p:nvCxnSpPr>
+          <p:cNvPr id="91" name="Straight Connector 90">
+            <a:extLst>
+              <a:ext uri="{FF2B5EF4-FFF2-40B4-BE49-F238E27FC236}">
+                <a16:creationId xmlns:a16="http://schemas.microsoft.com/office/drawing/2014/main" id="{A5580142-7828-7F41-BBB3-175B2380C0EB}"/>
+              </a:ext>
+            </a:extLst>
+          </p:cNvPr>
+          <p:cNvCxnSpPr>
+            <a:cxnSpLocks/>
+          </p:cNvCxnSpPr>
+          <p:nvPr/>
+        </p:nvCxnSpPr>
+        <p:spPr>
+          <a:xfrm flipH="1">
+            <a:off x="5608558" y="1848206"/>
+            <a:ext cx="3609" cy="922660"/>
+          </a:xfrm>
+          <a:prstGeom prst="line">
+            <a:avLst/>
+          </a:prstGeom>
+          <a:ln w="19050">
+            <a:solidFill>
+              <a:srgbClr val="0070C0"/>
+            </a:solidFill>
+            <a:prstDash val="sysDash"/>
+          </a:ln>
+          <a:effectLst/>
+        </p:spPr>
+        <p:style>
+          <a:lnRef idx="1">
+            <a:schemeClr val="accent1"/>
+          </a:lnRef>
+          <a:fillRef idx="2">
+            <a:schemeClr val="accent1"/>
+          </a:fillRef>
+          <a:effectRef idx="1">
+            <a:schemeClr val="accent1"/>
+          </a:effectRef>
+          <a:fontRef idx="minor">
+            <a:schemeClr val="dk1"/>
+          </a:fontRef>
+        </p:style>
+      </p:cxnSp>
+      <p:sp>
+        <p:nvSpPr>
+          <p:cNvPr id="94" name="Rectangle 93">
+            <a:extLst>
+              <a:ext uri="{FF2B5EF4-FFF2-40B4-BE49-F238E27FC236}">
+                <a16:creationId xmlns:a16="http://schemas.microsoft.com/office/drawing/2014/main" id="{541D2362-1D36-994A-B086-F2BEA10D9CB2}"/>
+              </a:ext>
+            </a:extLst>
+          </p:cNvPr>
+          <p:cNvSpPr/>
+          <p:nvPr/>
+        </p:nvSpPr>
+        <p:spPr>
+          <a:xfrm>
+            <a:off x="5529225" y="2375251"/>
+            <a:ext cx="163154" cy="234493"/>
+          </a:xfrm>
+          <a:prstGeom prst="rect">
+            <a:avLst/>
+          </a:prstGeom>
+          <a:solidFill>
+            <a:srgbClr val="0070C0"/>
+          </a:solidFill>
+          <a:ln>
+            <a:solidFill>
+              <a:srgbClr val="0070C0"/>
+            </a:solidFill>
+          </a:ln>
+          <a:effectLst/>
+        </p:spPr>
+        <p:style>
+          <a:lnRef idx="1">
+            <a:schemeClr val="accent3"/>
+          </a:lnRef>
+          <a:fillRef idx="2">
+            <a:schemeClr val="accent3"/>
+          </a:fillRef>
+          <a:effectRef idx="1">
+            <a:schemeClr val="accent3"/>
+          </a:effectRef>
+          <a:fontRef idx="minor">
+            <a:schemeClr val="dk1"/>
+          </a:fontRef>
+        </p:style>
+        <p:txBody>
+          <a:bodyPr rtlCol="0" anchor="ctr"/>
+          <a:lstStyle/>
+          <a:p>
+            <a:pPr algn="ctr"/>
+            <a:endParaRPr lang="en-SG" sz="1200"/>
+          </a:p>
+        </p:txBody>
+      </p:sp>
+      <p:sp>
+        <p:nvSpPr>
+          <p:cNvPr id="95" name="Rectangle 62">
+            <a:extLst>
+              <a:ext uri="{FF2B5EF4-FFF2-40B4-BE49-F238E27FC236}">
+                <a16:creationId xmlns:a16="http://schemas.microsoft.com/office/drawing/2014/main" id="{635D2691-517B-F64D-AB3A-BD6E841622A2}"/>
+              </a:ext>
+            </a:extLst>
+          </p:cNvPr>
+          <p:cNvSpPr/>
+          <p:nvPr/>
+        </p:nvSpPr>
+        <p:spPr>
+          <a:xfrm>
+            <a:off x="5181600" y="1794899"/>
+            <a:ext cx="899296" cy="338701"/>
+          </a:xfrm>
+          <a:prstGeom prst="rect">
+            <a:avLst/>
+          </a:prstGeom>
+          <a:solidFill>
+            <a:srgbClr val="0070C0"/>
+          </a:solidFill>
+          <a:ln w="19050">
+            <a:solidFill>
+              <a:srgbClr val="0070C0"/>
+            </a:solidFill>
+          </a:ln>
+          <a:effectLst/>
+        </p:spPr>
+        <p:style>
+          <a:lnRef idx="1">
+            <a:schemeClr val="accent2"/>
+          </a:lnRef>
+          <a:fillRef idx="2">
+            <a:schemeClr val="accent2"/>
+          </a:fillRef>
+          <a:effectRef idx="1">
+            <a:schemeClr val="accent2"/>
+          </a:effectRef>
+          <a:fontRef idx="minor">
+            <a:schemeClr val="dk1"/>
+          </a:fontRef>
+        </p:style>
+        <p:txBody>
+          <a:bodyPr rtlCol="0" anchor="ctr"/>
+          <a:lstStyle/>
+          <a:p>
+            <a:pPr algn="ctr"/>
+            <a:r>
+              <a:rPr lang="en-US" sz="1200" dirty="0">
+                <a:solidFill>
+                  <a:schemeClr val="bg1"/>
+                </a:solidFill>
+              </a:rPr>
+              <a:t>:</a:t>
+            </a:r>
+            <a:r>
+              <a:rPr lang="en-US" sz="1200" dirty="0" err="1">
+                <a:solidFill>
+                  <a:schemeClr val="bg1"/>
+                </a:solidFill>
+              </a:rPr>
+              <a:t>ParserUtil</a:t>
+            </a:r>
+            <a:endParaRPr lang="en-SG" sz="1200" dirty="0">
+              <a:solidFill>
+                <a:schemeClr val="bg1"/>
+              </a:solidFill>
+            </a:endParaRPr>
+          </a:p>
+        </p:txBody>
+      </p:sp>
+      <p:cxnSp>
+        <p:nvCxnSpPr>
+          <p:cNvPr id="96" name="Straight Arrow Connector 95">
+            <a:extLst>
+              <a:ext uri="{FF2B5EF4-FFF2-40B4-BE49-F238E27FC236}">
+                <a16:creationId xmlns:a16="http://schemas.microsoft.com/office/drawing/2014/main" id="{3D4D6523-E2A6-5C45-8E69-366A42213E63}"/>
+              </a:ext>
+            </a:extLst>
+          </p:cNvPr>
+          <p:cNvCxnSpPr>
+            <a:cxnSpLocks/>
+          </p:cNvCxnSpPr>
+          <p:nvPr/>
+        </p:nvCxnSpPr>
+        <p:spPr>
+          <a:xfrm>
+            <a:off x="4293700" y="2609746"/>
+            <a:ext cx="1234070" cy="0"/>
+          </a:xfrm>
+          <a:prstGeom prst="straightConnector1">
+            <a:avLst/>
+          </a:prstGeom>
+          <a:ln w="19050">
+            <a:solidFill>
+              <a:srgbClr val="0070C0"/>
+            </a:solidFill>
+            <a:prstDash val="sysDash"/>
+            <a:headEnd type="arrow" w="med" len="med"/>
+            <a:tailEnd type="none" w="med" len="med"/>
+          </a:ln>
+        </p:spPr>
+        <p:style>
+          <a:lnRef idx="1">
+            <a:schemeClr val="accent1"/>
+          </a:lnRef>
+          <a:fillRef idx="0">
+            <a:schemeClr val="accent1"/>
+          </a:fillRef>
+          <a:effectRef idx="0">
+            <a:schemeClr val="accent1"/>
+          </a:effectRef>
+          <a:fontRef idx="minor">
+            <a:schemeClr val="tx1"/>
+          </a:fontRef>
+        </p:style>
+      </p:cxnSp>
+      <p:sp>
+        <p:nvSpPr>
+          <p:cNvPr id="97" name="TextBox 96">
+            <a:extLst>
+              <a:ext uri="{FF2B5EF4-FFF2-40B4-BE49-F238E27FC236}">
+                <a16:creationId xmlns:a16="http://schemas.microsoft.com/office/drawing/2014/main" id="{81EC992F-E2AC-FD42-9F3C-89C652A57948}"/>
+              </a:ext>
+            </a:extLst>
+          </p:cNvPr>
+          <p:cNvSpPr txBox="1"/>
+          <p:nvPr/>
+        </p:nvSpPr>
+        <p:spPr>
+          <a:xfrm>
+            <a:off x="4322669" y="2414918"/>
+            <a:ext cx="1238465" cy="184666"/>
+          </a:xfrm>
+          <a:prstGeom prst="rect">
+            <a:avLst/>
+          </a:prstGeom>
+          <a:noFill/>
+        </p:spPr>
+        <p:txBody>
+          <a:bodyPr wrap="square" lIns="0" tIns="0" rIns="0" bIns="0" rtlCol="0">
+            <a:spAutoFit/>
+          </a:bodyPr>
+          <a:lstStyle>
+            <a:defPPr>
+              <a:defRPr lang="en-US"/>
+            </a:defPPr>
+            <a:lvl1pPr algn="r">
+              <a:defRPr sz="1400">
+                <a:solidFill>
+                  <a:srgbClr val="0070C0"/>
+                </a:solidFill>
+              </a:defRPr>
+            </a:lvl1pPr>
+          </a:lstStyle>
+          <a:p>
+            <a:pPr algn="ctr"/>
+            <a:r>
+              <a:rPr lang="en-US" sz="1200" dirty="0"/>
+              <a:t>index</a:t>
+            </a:r>
+          </a:p>
+        </p:txBody>
+      </p:sp>
+      <p:sp>
+        <p:nvSpPr>
+          <p:cNvPr id="16" name="Rectangle 62"/>
+          <p:cNvSpPr/>
+          <p:nvPr/>
+        </p:nvSpPr>
+        <p:spPr>
+          <a:xfrm>
+            <a:off x="1981200" y="981651"/>
+            <a:ext cx="1026104" cy="467684"/>
+          </a:xfrm>
+          <a:prstGeom prst="rect">
+            <a:avLst/>
+          </a:prstGeom>
+          <a:solidFill>
+            <a:srgbClr val="0070C0"/>
+          </a:solidFill>
+          <a:ln w="19050">
+            <a:solidFill>
+              <a:srgbClr val="0070C0"/>
+            </a:solidFill>
+          </a:ln>
+          <a:effectLst/>
+        </p:spPr>
+        <p:style>
+          <a:lnRef idx="1">
+            <a:schemeClr val="accent2"/>
+          </a:lnRef>
+          <a:fillRef idx="2">
+            <a:schemeClr val="accent2"/>
+          </a:fillRef>
+          <a:effectRef idx="1">
+            <a:schemeClr val="accent2"/>
+          </a:effectRef>
+          <a:fontRef idx="minor">
+            <a:schemeClr val="dk1"/>
+          </a:fontRef>
+        </p:style>
+        <p:txBody>
+          <a:bodyPr rtlCol="0" anchor="ctr"/>
+          <a:lstStyle/>
+          <a:p>
+            <a:pPr algn="ctr"/>
+            <a:r>
+              <a:rPr lang="en-US" sz="1200" dirty="0">
+                <a:solidFill>
+                  <a:schemeClr val="bg1"/>
+                </a:solidFill>
+              </a:rPr>
+              <a:t>:</a:t>
+            </a:r>
+            <a:r>
+              <a:rPr lang="en-US" sz="1200" dirty="0" err="1">
+                <a:solidFill>
+                  <a:schemeClr val="bg1"/>
+                </a:solidFill>
+              </a:rPr>
+              <a:t>FoodDiary</a:t>
+            </a:r>
+            <a:endParaRPr lang="en-US" sz="1200" dirty="0">
+              <a:solidFill>
+                <a:schemeClr val="bg1"/>
+              </a:solidFill>
+            </a:endParaRPr>
+          </a:p>
+          <a:p>
+            <a:pPr algn="ctr"/>
+            <a:r>
+              <a:rPr lang="en-US" sz="1200" dirty="0">
+                <a:solidFill>
+                  <a:schemeClr val="bg1"/>
+                </a:solidFill>
+              </a:rPr>
+              <a:t>Parser</a:t>
+            </a:r>
+            <a:endParaRPr lang="en-SG" sz="1200" dirty="0">
+              <a:solidFill>
+                <a:schemeClr val="bg1"/>
+              </a:solidFill>
+            </a:endParaRPr>
+          </a:p>
+        </p:txBody>
+      </p:sp>
+      <p:sp>
+        <p:nvSpPr>
+          <p:cNvPr id="100" name="Rectangle 99">
+            <a:extLst>
+              <a:ext uri="{FF2B5EF4-FFF2-40B4-BE49-F238E27FC236}">
+                <a16:creationId xmlns:a16="http://schemas.microsoft.com/office/drawing/2014/main" id="{EFEB478E-C351-614F-9566-A7825C26169F}"/>
+              </a:ext>
+            </a:extLst>
+          </p:cNvPr>
+          <p:cNvSpPr/>
+          <p:nvPr/>
+        </p:nvSpPr>
+        <p:spPr>
+          <a:xfrm>
+            <a:off x="4135182" y="2221283"/>
+            <a:ext cx="187486" cy="1225349"/>
+          </a:xfrm>
+          <a:prstGeom prst="rect">
+            <a:avLst/>
+          </a:prstGeom>
+          <a:solidFill>
+            <a:srgbClr val="0070C0"/>
+          </a:solidFill>
+          <a:ln>
+            <a:solidFill>
+              <a:srgbClr val="0070C0"/>
+            </a:solidFill>
+          </a:ln>
+          <a:effectLst/>
+        </p:spPr>
+        <p:style>
+          <a:lnRef idx="1">
+            <a:schemeClr val="accent3"/>
+          </a:lnRef>
+          <a:fillRef idx="2">
+            <a:schemeClr val="accent3"/>
+          </a:fillRef>
+          <a:effectRef idx="1">
+            <a:schemeClr val="accent3"/>
+          </a:effectRef>
+          <a:fontRef idx="minor">
+            <a:schemeClr val="dk1"/>
+          </a:fontRef>
+        </p:style>
+        <p:txBody>
+          <a:bodyPr rtlCol="0" anchor="ctr"/>
+          <a:lstStyle/>
+          <a:p>
+            <a:pPr algn="ctr"/>
+            <a:endParaRPr lang="en-SG" sz="1400"/>
+          </a:p>
+        </p:txBody>
+      </p:sp>
+      <p:cxnSp>
+        <p:nvCxnSpPr>
+          <p:cNvPr id="101" name="Straight Connector 100">
+            <a:extLst>
+              <a:ext uri="{FF2B5EF4-FFF2-40B4-BE49-F238E27FC236}">
+                <a16:creationId xmlns:a16="http://schemas.microsoft.com/office/drawing/2014/main" id="{CFBB3F77-B57D-0644-8600-2C815787B1F3}"/>
+              </a:ext>
+            </a:extLst>
+          </p:cNvPr>
+          <p:cNvCxnSpPr>
+            <a:cxnSpLocks/>
+          </p:cNvCxnSpPr>
+          <p:nvPr/>
+        </p:nvCxnSpPr>
+        <p:spPr>
+          <a:xfrm>
+            <a:off x="4234805" y="1710858"/>
+            <a:ext cx="0" cy="1908580"/>
+          </a:xfrm>
+          <a:prstGeom prst="line">
+            <a:avLst/>
+          </a:prstGeom>
+          <a:ln w="19050">
+            <a:solidFill>
+              <a:srgbClr val="0070C0"/>
+            </a:solidFill>
+            <a:prstDash val="sysDash"/>
+          </a:ln>
+          <a:effectLst/>
+        </p:spPr>
+        <p:style>
+          <a:lnRef idx="1">
+            <a:schemeClr val="accent1"/>
+          </a:lnRef>
+          <a:fillRef idx="2">
+            <a:schemeClr val="accent1"/>
+          </a:fillRef>
+          <a:effectRef idx="1">
+            <a:schemeClr val="accent1"/>
+          </a:effectRef>
+          <a:fontRef idx="minor">
+            <a:schemeClr val="dk1"/>
+          </a:fontRef>
+        </p:style>
+      </p:cxnSp>
+      <p:cxnSp>
+        <p:nvCxnSpPr>
+          <p:cNvPr id="20" name="Straight Connector 19"/>
+          <p:cNvCxnSpPr>
+            <a:cxnSpLocks/>
+            <a:stCxn id="21" idx="0"/>
+          </p:cNvCxnSpPr>
+          <p:nvPr/>
+        </p:nvCxnSpPr>
+        <p:spPr>
+          <a:xfrm>
+            <a:off x="5589279" y="3124200"/>
+            <a:ext cx="0" cy="2911359"/>
+          </a:xfrm>
+          <a:prstGeom prst="line">
+            <a:avLst/>
+          </a:prstGeom>
+          <a:ln w="19050">
+            <a:solidFill>
+              <a:srgbClr val="0070C0"/>
+            </a:solidFill>
+            <a:prstDash val="sysDash"/>
+          </a:ln>
+          <a:effectLst/>
+        </p:spPr>
+        <p:style>
+          <a:lnRef idx="1">
+            <a:schemeClr val="accent1"/>
+          </a:lnRef>
+          <a:fillRef idx="2">
+            <a:schemeClr val="accent1"/>
+          </a:fillRef>
+          <a:effectRef idx="1">
+            <a:schemeClr val="accent1"/>
+          </a:effectRef>
+          <a:fontRef idx="minor">
+            <a:schemeClr val="dk1"/>
+          </a:fontRef>
+        </p:style>
+      </p:cxnSp>
+      <p:sp>
+        <p:nvSpPr>
+          <p:cNvPr id="21" name="Rectangle 20"/>
+          <p:cNvSpPr/>
+          <p:nvPr/>
+        </p:nvSpPr>
+        <p:spPr>
+          <a:xfrm>
+            <a:off x="5513079" y="3124200"/>
+            <a:ext cx="152400" cy="276003"/>
+          </a:xfrm>
+          <a:prstGeom prst="rect">
+            <a:avLst/>
+          </a:prstGeom>
+          <a:solidFill>
+            <a:srgbClr val="0070C0"/>
+          </a:solidFill>
+          <a:ln>
+            <a:solidFill>
+              <a:srgbClr val="0070C0"/>
+            </a:solidFill>
+          </a:ln>
+          <a:effectLst/>
+        </p:spPr>
+        <p:style>
+          <a:lnRef idx="1">
+            <a:schemeClr val="accent3"/>
+          </a:lnRef>
+          <a:fillRef idx="2">
+            <a:schemeClr val="accent3"/>
+          </a:fillRef>
+          <a:effectRef idx="1">
+            <a:schemeClr val="accent3"/>
+          </a:effectRef>
+          <a:fontRef idx="minor">
+            <a:schemeClr val="dk1"/>
+          </a:fontRef>
+        </p:style>
+        <p:txBody>
+          <a:bodyPr rtlCol="0" anchor="ctr"/>
+          <a:lstStyle/>
+          <a:p>
+            <a:pPr algn="ctr"/>
+            <a:endParaRPr lang="en-SG" sz="1400"/>
+          </a:p>
+        </p:txBody>
+      </p:sp>
+      <p:cxnSp>
+        <p:nvCxnSpPr>
+          <p:cNvPr id="28" name="Straight Arrow Connector 27"/>
+          <p:cNvCxnSpPr>
+            <a:cxnSpLocks/>
+            <a:endCxn id="19" idx="1"/>
+          </p:cNvCxnSpPr>
+          <p:nvPr/>
+        </p:nvCxnSpPr>
+        <p:spPr>
+          <a:xfrm>
+            <a:off x="4301889" y="3059747"/>
+            <a:ext cx="835408" cy="0"/>
+          </a:xfrm>
+          <a:prstGeom prst="straightConnector1">
+            <a:avLst/>
+          </a:prstGeom>
+          <a:ln w="19050">
+            <a:solidFill>
+              <a:srgbClr val="0070C0"/>
+            </a:solidFill>
+            <a:tailEnd type="arrow"/>
+          </a:ln>
+        </p:spPr>
+        <p:style>
+          <a:lnRef idx="1">
+            <a:schemeClr val="accent1"/>
+          </a:lnRef>
+          <a:fillRef idx="0">
+            <a:schemeClr val="accent1"/>
+          </a:fillRef>
+          <a:effectRef idx="0">
+            <a:schemeClr val="accent1"/>
+          </a:effectRef>
+          <a:fontRef idx="minor">
+            <a:schemeClr val="tx1"/>
+          </a:fontRef>
+        </p:style>
+      </p:cxnSp>
+      <p:cxnSp>
+        <p:nvCxnSpPr>
+          <p:cNvPr id="34" name="Straight Arrow Connector 33"/>
+          <p:cNvCxnSpPr>
+            <a:cxnSpLocks/>
+          </p:cNvCxnSpPr>
+          <p:nvPr/>
+        </p:nvCxnSpPr>
+        <p:spPr>
+          <a:xfrm>
+            <a:off x="4310593" y="3388799"/>
+            <a:ext cx="1278686" cy="0"/>
+          </a:xfrm>
+          <a:prstGeom prst="straightConnector1">
+            <a:avLst/>
+          </a:prstGeom>
+          <a:ln w="19050">
+            <a:solidFill>
+              <a:srgbClr val="0070C0"/>
+            </a:solidFill>
+            <a:prstDash val="sysDash"/>
+            <a:headEnd type="arrow" w="med" len="med"/>
+            <a:tailEnd type="none" w="med" len="med"/>
+          </a:ln>
+        </p:spPr>
+        <p:style>
+          <a:lnRef idx="1">
+            <a:schemeClr val="accent1"/>
+          </a:lnRef>
+          <a:fillRef idx="0">
+            <a:schemeClr val="accent1"/>
+          </a:fillRef>
+          <a:effectRef idx="0">
+            <a:schemeClr val="accent1"/>
+          </a:effectRef>
+          <a:fontRef idx="minor">
+            <a:schemeClr val="tx1"/>
+          </a:fontRef>
+        </p:style>
+      </p:cxnSp>
+      <p:sp>
+        <p:nvSpPr>
+          <p:cNvPr id="65" name="Rectangle 64"/>
+          <p:cNvSpPr/>
+          <p:nvPr/>
+        </p:nvSpPr>
+        <p:spPr>
+          <a:xfrm>
+            <a:off x="5508300" y="3731062"/>
+            <a:ext cx="166707" cy="2218899"/>
+          </a:xfrm>
+          <a:prstGeom prst="rect">
+            <a:avLst/>
+          </a:prstGeom>
+          <a:solidFill>
+            <a:srgbClr val="0070C0"/>
+          </a:solidFill>
+          <a:ln>
+            <a:solidFill>
+              <a:srgbClr val="0070C0"/>
+            </a:solidFill>
+          </a:ln>
+          <a:effectLst/>
+        </p:spPr>
+        <p:style>
+          <a:lnRef idx="1">
+            <a:schemeClr val="accent3"/>
+          </a:lnRef>
+          <a:fillRef idx="2">
+            <a:schemeClr val="accent3"/>
+          </a:fillRef>
+          <a:effectRef idx="1">
+            <a:schemeClr val="accent3"/>
+          </a:effectRef>
+          <a:fontRef idx="minor">
+            <a:schemeClr val="dk1"/>
+          </a:fontRef>
+        </p:style>
+        <p:txBody>
+          <a:bodyPr rtlCol="0" anchor="ctr"/>
+          <a:lstStyle/>
+          <a:p>
+            <a:pPr algn="ctr"/>
+            <a:endParaRPr lang="en-SG" sz="1400"/>
+          </a:p>
+        </p:txBody>
+      </p:sp>
+      <p:sp>
+        <p:nvSpPr>
+          <p:cNvPr id="4" name="TextBox 3"/>
+          <p:cNvSpPr txBox="1"/>
+          <p:nvPr/>
+        </p:nvSpPr>
+        <p:spPr>
+          <a:xfrm>
+            <a:off x="5460077" y="5953319"/>
+            <a:ext cx="258404" cy="261610"/>
+          </a:xfrm>
+          <a:prstGeom prst="rect">
+            <a:avLst/>
+          </a:prstGeom>
+          <a:noFill/>
+        </p:spPr>
+        <p:txBody>
+          <a:bodyPr wrap="none" rtlCol="0">
+            <a:spAutoFit/>
+          </a:bodyPr>
+          <a:lstStyle/>
+          <a:p>
+            <a:r>
+              <a:rPr lang="en-SG" sz="1100" dirty="0">
+                <a:solidFill>
+                  <a:srgbClr val="002060"/>
+                </a:solidFill>
+              </a:rPr>
+              <a:t>X</a:t>
+            </a:r>
+          </a:p>
+        </p:txBody>
+      </p:sp>
+      <p:sp>
+        <p:nvSpPr>
+          <p:cNvPr id="19" name="Rectangle 62"/>
+          <p:cNvSpPr/>
+          <p:nvPr/>
+        </p:nvSpPr>
+        <p:spPr>
+          <a:xfrm>
+            <a:off x="5137297" y="2828978"/>
+            <a:ext cx="920426" cy="461538"/>
+          </a:xfrm>
+          <a:prstGeom prst="rect">
+            <a:avLst/>
+          </a:prstGeom>
+          <a:solidFill>
+            <a:srgbClr val="0070C0"/>
+          </a:solidFill>
+          <a:ln w="19050">
+            <a:solidFill>
+              <a:srgbClr val="0070C0"/>
+            </a:solidFill>
+          </a:ln>
+          <a:effectLst/>
+        </p:spPr>
+        <p:style>
+          <a:lnRef idx="1">
+            <a:schemeClr val="accent2"/>
+          </a:lnRef>
+          <a:fillRef idx="2">
+            <a:schemeClr val="accent2"/>
+          </a:fillRef>
+          <a:effectRef idx="1">
+            <a:schemeClr val="accent2"/>
+          </a:effectRef>
+          <a:fontRef idx="minor">
+            <a:schemeClr val="dk1"/>
+          </a:fontRef>
+        </p:style>
+        <p:txBody>
+          <a:bodyPr rtlCol="0" anchor="ctr"/>
+          <a:lstStyle/>
+          <a:p>
+            <a:pPr algn="ctr"/>
+            <a:r>
+              <a:rPr lang="en-US" sz="1200" dirty="0" err="1">
+                <a:solidFill>
+                  <a:schemeClr val="bg1"/>
+                </a:solidFill>
+              </a:rPr>
+              <a:t>s:Select</a:t>
+            </a:r>
+            <a:br>
+              <a:rPr lang="en-US" sz="1200" dirty="0">
+                <a:solidFill>
+                  <a:schemeClr val="bg1"/>
+                </a:solidFill>
+              </a:rPr>
+            </a:br>
+            <a:r>
+              <a:rPr lang="en-US" sz="1200" dirty="0">
+                <a:solidFill>
+                  <a:schemeClr val="bg1"/>
+                </a:solidFill>
+              </a:rPr>
+              <a:t>Command</a:t>
+            </a:r>
+            <a:endParaRPr lang="en-SG" sz="1200" dirty="0">
+              <a:solidFill>
+                <a:schemeClr val="bg1"/>
+              </a:solidFill>
+            </a:endParaRPr>
+          </a:p>
+        </p:txBody>
+      </p:sp>
+      <p:sp>
+        <p:nvSpPr>
+          <p:cNvPr id="82" name="Rectangle 62">
+            <a:extLst>
+              <a:ext uri="{FF2B5EF4-FFF2-40B4-BE49-F238E27FC236}">
+                <a16:creationId xmlns:a16="http://schemas.microsoft.com/office/drawing/2014/main" id="{5086D6DE-E77C-D74E-85FA-C3B0963E8A51}"/>
+              </a:ext>
+            </a:extLst>
+          </p:cNvPr>
+          <p:cNvSpPr/>
+          <p:nvPr/>
+        </p:nvSpPr>
+        <p:spPr>
+          <a:xfrm>
+            <a:off x="3766572" y="1285004"/>
+            <a:ext cx="957828" cy="637205"/>
+          </a:xfrm>
+          <a:prstGeom prst="rect">
+            <a:avLst/>
+          </a:prstGeom>
+          <a:solidFill>
+            <a:srgbClr val="0070C0"/>
+          </a:solidFill>
+          <a:ln w="19050">
+            <a:solidFill>
+              <a:srgbClr val="0070C0"/>
+            </a:solidFill>
+          </a:ln>
+          <a:effectLst/>
+        </p:spPr>
+        <p:style>
+          <a:lnRef idx="1">
+            <a:schemeClr val="accent2"/>
+          </a:lnRef>
+          <a:fillRef idx="2">
+            <a:schemeClr val="accent2"/>
+          </a:fillRef>
+          <a:effectRef idx="1">
+            <a:schemeClr val="accent2"/>
+          </a:effectRef>
+          <a:fontRef idx="minor">
+            <a:schemeClr val="dk1"/>
+          </a:fontRef>
+        </p:style>
+        <p:txBody>
+          <a:bodyPr rtlCol="0" anchor="ctr"/>
+          <a:lstStyle/>
+          <a:p>
+            <a:pPr algn="ctr"/>
+            <a:r>
+              <a:rPr lang="en-US" sz="1200" dirty="0">
+                <a:solidFill>
+                  <a:schemeClr val="bg1"/>
+                </a:solidFill>
+              </a:rPr>
+              <a:t>:Select</a:t>
+            </a:r>
+            <a:br>
+              <a:rPr lang="en-US" sz="1200" dirty="0">
+                <a:solidFill>
+                  <a:schemeClr val="bg1"/>
+                </a:solidFill>
+              </a:rPr>
+            </a:br>
+            <a:r>
+              <a:rPr lang="en-US" sz="1200" dirty="0">
+                <a:solidFill>
+                  <a:schemeClr val="bg1"/>
+                </a:solidFill>
+              </a:rPr>
+              <a:t>Command</a:t>
+            </a:r>
+            <a:br>
+              <a:rPr lang="en-US" sz="1200" dirty="0">
+                <a:solidFill>
+                  <a:schemeClr val="bg1"/>
+                </a:solidFill>
+              </a:rPr>
+            </a:br>
+            <a:r>
+              <a:rPr lang="en-US" sz="1200" dirty="0">
+                <a:solidFill>
+                  <a:schemeClr val="bg1"/>
+                </a:solidFill>
+              </a:rPr>
+              <a:t>Parser</a:t>
+            </a:r>
+            <a:endParaRPr lang="en-SG" sz="1200" dirty="0">
+              <a:solidFill>
+                <a:schemeClr val="bg1"/>
+              </a:solidFill>
+            </a:endParaRPr>
+          </a:p>
+        </p:txBody>
+      </p:sp>
+      <p:sp>
+        <p:nvSpPr>
+          <p:cNvPr id="102" name="TextBox 101">
+            <a:extLst>
+              <a:ext uri="{FF2B5EF4-FFF2-40B4-BE49-F238E27FC236}">
+                <a16:creationId xmlns:a16="http://schemas.microsoft.com/office/drawing/2014/main" id="{8A543855-871D-1949-B354-70B1BA554B70}"/>
+              </a:ext>
+            </a:extLst>
+          </p:cNvPr>
+          <p:cNvSpPr txBox="1"/>
+          <p:nvPr/>
+        </p:nvSpPr>
+        <p:spPr>
+          <a:xfrm>
+            <a:off x="4107366" y="3474158"/>
+            <a:ext cx="258404" cy="261610"/>
+          </a:xfrm>
+          <a:prstGeom prst="rect">
+            <a:avLst/>
+          </a:prstGeom>
+          <a:noFill/>
+        </p:spPr>
+        <p:txBody>
+          <a:bodyPr wrap="none" rtlCol="0">
+            <a:spAutoFit/>
+          </a:bodyPr>
+          <a:lstStyle/>
+          <a:p>
+            <a:r>
+              <a:rPr lang="en-SG" sz="1100" dirty="0">
+                <a:solidFill>
+                  <a:srgbClr val="002060"/>
+                </a:solidFill>
+              </a:rPr>
+              <a:t>X</a:t>
+            </a:r>
+          </a:p>
+        </p:txBody>
+      </p:sp>
+      <p:cxnSp>
+        <p:nvCxnSpPr>
+          <p:cNvPr id="113" name="Straight Arrow Connector 112">
+            <a:extLst>
+              <a:ext uri="{FF2B5EF4-FFF2-40B4-BE49-F238E27FC236}">
+                <a16:creationId xmlns:a16="http://schemas.microsoft.com/office/drawing/2014/main" id="{9B7C8361-DB5D-5748-B0A6-D7DC34712DEF}"/>
+              </a:ext>
+            </a:extLst>
+          </p:cNvPr>
+          <p:cNvCxnSpPr>
+            <a:cxnSpLocks/>
+          </p:cNvCxnSpPr>
+          <p:nvPr/>
+        </p:nvCxnSpPr>
+        <p:spPr>
+          <a:xfrm>
+            <a:off x="2572659" y="3437364"/>
+            <a:ext cx="1584230" cy="1699"/>
+          </a:xfrm>
+          <a:prstGeom prst="straightConnector1">
+            <a:avLst/>
+          </a:prstGeom>
+          <a:ln w="19050">
+            <a:solidFill>
+              <a:srgbClr val="0070C0"/>
+            </a:solidFill>
+            <a:prstDash val="sysDash"/>
+            <a:headEnd type="arrow" w="med" len="med"/>
+            <a:tailEnd type="none" w="med" len="med"/>
+          </a:ln>
+        </p:spPr>
+        <p:style>
+          <a:lnRef idx="1">
+            <a:schemeClr val="accent1"/>
+          </a:lnRef>
+          <a:fillRef idx="0">
+            <a:schemeClr val="accent1"/>
+          </a:fillRef>
+          <a:effectRef idx="0">
+            <a:schemeClr val="accent1"/>
+          </a:effectRef>
+          <a:fontRef idx="minor">
+            <a:schemeClr val="tx1"/>
+          </a:fontRef>
+        </p:style>
+      </p:cxnSp>
+      <p:sp>
+        <p:nvSpPr>
+          <p:cNvPr id="114" name="TextBox 113">
+            <a:extLst>
+              <a:ext uri="{FF2B5EF4-FFF2-40B4-BE49-F238E27FC236}">
+                <a16:creationId xmlns:a16="http://schemas.microsoft.com/office/drawing/2014/main" id="{B535D06E-F133-3748-A3E6-B61C433128E6}"/>
+              </a:ext>
+            </a:extLst>
+          </p:cNvPr>
+          <p:cNvSpPr txBox="1"/>
+          <p:nvPr/>
+        </p:nvSpPr>
+        <p:spPr>
+          <a:xfrm>
+            <a:off x="3236553" y="3211256"/>
+            <a:ext cx="220343" cy="215444"/>
+          </a:xfrm>
+          <a:prstGeom prst="rect">
+            <a:avLst/>
+          </a:prstGeom>
+          <a:noFill/>
+        </p:spPr>
+        <p:txBody>
+          <a:bodyPr wrap="square" lIns="0" tIns="0" rIns="0" bIns="0" rtlCol="0">
+            <a:spAutoFit/>
+          </a:bodyPr>
+          <a:lstStyle>
+            <a:defPPr>
+              <a:defRPr lang="en-US"/>
+            </a:defPPr>
+            <a:lvl1pPr algn="r">
+              <a:defRPr sz="1400">
+                <a:solidFill>
+                  <a:srgbClr val="0070C0"/>
+                </a:solidFill>
+              </a:defRPr>
+            </a:lvl1pPr>
+          </a:lstStyle>
+          <a:p>
+            <a:r>
+              <a:rPr lang="en-US" dirty="0"/>
+              <a:t>s</a:t>
+            </a:r>
           </a:p>
         </p:txBody>
       </p:sp>

</xml_diff>